<commit_message>
Changed to past version
</commit_message>
<xml_diff>
--- a/app/maker/plantilla python.pptx
+++ b/app/maker/plantilla python.pptx
@@ -648,37 +648,6 @@
 
 <file path=ppt/slideLayouts/slideLayout1.xml><?xml version="1.0" encoding="utf-8"?>
 <p:sldLayout xmlns:a="http://schemas.openxmlformats.org/drawingml/2006/main" xmlns:r="http://schemas.openxmlformats.org/officeDocument/2006/relationships" xmlns:p="http://schemas.openxmlformats.org/presentationml/2006/main" preserve="1" userDrawn="1">
-  <p:cSld name="Blank">
-    <p:spTree>
-      <p:nvGrpSpPr>
-        <p:cNvPr id="1" name=""/>
-        <p:cNvGrpSpPr/>
-        <p:nvPr/>
-      </p:nvGrpSpPr>
-      <p:grpSpPr>
-        <a:xfrm>
-          <a:off x="0" y="0"/>
-          <a:ext cx="0" cy="0"/>
-          <a:chOff x="0" y="0"/>
-          <a:chExt cx="0" cy="0"/>
-        </a:xfrm>
-      </p:grpSpPr>
-    </p:spTree>
-    <p:extLst>
-      <p:ext uri="{BB962C8B-B14F-4D97-AF65-F5344CB8AC3E}">
-        <p14:creationId xmlns:p14="http://schemas.microsoft.com/office/powerpoint/2010/main" val="619158941"/>
-      </p:ext>
-    </p:extLst>
-  </p:cSld>
-  <p:clrMapOvr>
-    <a:masterClrMapping/>
-  </p:clrMapOvr>
-  <p:transition spd="med"/>
-</p:sldLayout>
-</file>
-
-<file path=ppt/slideLayouts/slideLayout2.xml><?xml version="1.0" encoding="utf-8"?>
-<p:sldLayout xmlns:a="http://schemas.openxmlformats.org/drawingml/2006/main" xmlns:r="http://schemas.openxmlformats.org/officeDocument/2006/relationships" xmlns:p="http://schemas.openxmlformats.org/presentationml/2006/main" preserve="1" userDrawn="1">
   <p:cSld name="Custom Layout">
     <p:spTree>
       <p:nvGrpSpPr>
@@ -870,7 +839,7 @@
 </p:sldLayout>
 </file>
 
-<file path=ppt/slideLayouts/slideLayout3.xml><?xml version="1.0" encoding="utf-8"?>
+<file path=ppt/slideLayouts/slideLayout2.xml><?xml version="1.0" encoding="utf-8"?>
 <p:sldLayout xmlns:a="http://schemas.openxmlformats.org/drawingml/2006/main" xmlns:r="http://schemas.openxmlformats.org/officeDocument/2006/relationships" xmlns:p="http://schemas.openxmlformats.org/presentationml/2006/main" preserve="1" userDrawn="1">
   <p:cSld name="Primera Lectura">
     <p:spTree>
@@ -1463,7 +1432,7 @@
 </p:sldLayout>
 </file>
 
-<file path=ppt/slideLayouts/slideLayout4.xml><?xml version="1.0" encoding="utf-8"?>
+<file path=ppt/slideLayouts/slideLayout3.xml><?xml version="1.0" encoding="utf-8"?>
 <p:sldLayout xmlns:a="http://schemas.openxmlformats.org/drawingml/2006/main" xmlns:r="http://schemas.openxmlformats.org/officeDocument/2006/relationships" xmlns:p="http://schemas.openxmlformats.org/presentationml/2006/main" preserve="1" userDrawn="1">
   <p:cSld name="Salmo">
     <p:spTree>
@@ -1838,7 +1807,7 @@
 </p:sldLayout>
 </file>
 
-<file path=ppt/slideLayouts/slideLayout5.xml><?xml version="1.0" encoding="utf-8"?>
+<file path=ppt/slideLayouts/slideLayout4.xml><?xml version="1.0" encoding="utf-8"?>
 <p:sldLayout xmlns:a="http://schemas.openxmlformats.org/drawingml/2006/main" xmlns:r="http://schemas.openxmlformats.org/officeDocument/2006/relationships" xmlns:p="http://schemas.openxmlformats.org/presentationml/2006/main" preserve="1" userDrawn="1">
   <p:cSld name="Segunda Lectura">
     <p:spTree>
@@ -2442,7 +2411,7 @@
 </p:sldLayout>
 </file>
 
-<file path=ppt/slideLayouts/slideLayout6.xml><?xml version="1.0" encoding="utf-8"?>
+<file path=ppt/slideLayouts/slideLayout5.xml><?xml version="1.0" encoding="utf-8"?>
 <p:sldLayout xmlns:a="http://schemas.openxmlformats.org/drawingml/2006/main" xmlns:r="http://schemas.openxmlformats.org/officeDocument/2006/relationships" xmlns:p="http://schemas.openxmlformats.org/presentationml/2006/main" preserve="1" userDrawn="1">
   <p:cSld name="2_Primera Lectura">
     <p:spTree>
@@ -2988,6 +2957,37 @@
 </p:sldLayout>
 </file>
 
+<file path=ppt/slideLayouts/slideLayout6.xml><?xml version="1.0" encoding="utf-8"?>
+<p:sldLayout xmlns:a="http://schemas.openxmlformats.org/drawingml/2006/main" xmlns:r="http://schemas.openxmlformats.org/officeDocument/2006/relationships" xmlns:p="http://schemas.openxmlformats.org/presentationml/2006/main" preserve="1" userDrawn="1">
+  <p:cSld name="Blank">
+    <p:spTree>
+      <p:nvGrpSpPr>
+        <p:cNvPr id="1" name=""/>
+        <p:cNvGrpSpPr/>
+        <p:nvPr/>
+      </p:nvGrpSpPr>
+      <p:grpSpPr>
+        <a:xfrm>
+          <a:off x="0" y="0"/>
+          <a:ext cx="0" cy="0"/>
+          <a:chOff x="0" y="0"/>
+          <a:chExt cx="0" cy="0"/>
+        </a:xfrm>
+      </p:grpSpPr>
+    </p:spTree>
+    <p:extLst>
+      <p:ext uri="{BB962C8B-B14F-4D97-AF65-F5344CB8AC3E}">
+        <p14:creationId xmlns:p14="http://schemas.microsoft.com/office/powerpoint/2010/main" val="619158941"/>
+      </p:ext>
+    </p:extLst>
+  </p:cSld>
+  <p:clrMapOvr>
+    <a:masterClrMapping/>
+  </p:clrMapOvr>
+  <p:transition spd="med"/>
+</p:sldLayout>
+</file>
+
 <file path=ppt/slideMasters/slideMaster1.xml><?xml version="1.0" encoding="utf-8"?>
 <p:sldMaster xmlns:a="http://schemas.openxmlformats.org/drawingml/2006/main" xmlns:r="http://schemas.openxmlformats.org/officeDocument/2006/relationships" xmlns:p="http://schemas.openxmlformats.org/presentationml/2006/main">
   <p:cSld>
@@ -3079,12 +3079,12 @@
   </p:cSld>
   <p:clrMap bg1="lt1" tx1="dk1" bg2="lt2" tx2="dk2" accent1="accent1" accent2="accent2" accent3="accent3" accent4="accent4" accent5="accent5" accent6="accent6" hlink="hlink" folHlink="folHlink"/>
   <p:sldLayoutIdLst>
-    <p:sldLayoutId id="2147483658" r:id="rId1"/>
-    <p:sldLayoutId id="2147483651" r:id="rId2"/>
-    <p:sldLayoutId id="2147483650" r:id="rId3"/>
-    <p:sldLayoutId id="2147483655" r:id="rId4"/>
-    <p:sldLayoutId id="2147483656" r:id="rId5"/>
-    <p:sldLayoutId id="2147483657" r:id="rId6"/>
+    <p:sldLayoutId id="2147483651" r:id="rId1"/>
+    <p:sldLayoutId id="2147483650" r:id="rId2"/>
+    <p:sldLayoutId id="2147483655" r:id="rId3"/>
+    <p:sldLayoutId id="2147483656" r:id="rId4"/>
+    <p:sldLayoutId id="2147483657" r:id="rId5"/>
+    <p:sldLayoutId id="2147483658" r:id="rId6"/>
   </p:sldLayoutIdLst>
   <p:transition spd="med"/>
   <p:timing>

</xml_diff>

<commit_message>
Added slide layouts for imaages and anouncements
</commit_message>
<xml_diff>
--- a/app/maker/plantilla python.pptx
+++ b/app/maker/plantilla python.pptx
@@ -407,7 +407,7 @@
           <a:p>
             <a:fld id="{A2F1CC36-F4A9-BC45-A389-D7D93F3A36E0}" type="datetimeFigureOut">
               <a:rPr lang="en-US" smtClean="0"/>
-              <a:t>12/9/17</a:t>
+              <a:t>12/13/17</a:t>
             </a:fld>
             <a:endParaRPr lang="en-US"/>
           </a:p>
@@ -2959,6 +2959,395 @@
 
 <file path=ppt/slideLayouts/slideLayout6.xml><?xml version="1.0" encoding="utf-8"?>
 <p:sldLayout xmlns:a="http://schemas.openxmlformats.org/drawingml/2006/main" xmlns:r="http://schemas.openxmlformats.org/officeDocument/2006/relationships" xmlns:p="http://schemas.openxmlformats.org/presentationml/2006/main" preserve="1" userDrawn="1">
+  <p:cSld name="3_Primera Lectura">
+    <p:spTree>
+      <p:nvGrpSpPr>
+        <p:cNvPr id="1" name=""/>
+        <p:cNvGrpSpPr/>
+        <p:nvPr/>
+      </p:nvGrpSpPr>
+      <p:grpSpPr>
+        <a:xfrm>
+          <a:off x="0" y="0"/>
+          <a:ext cx="0" cy="0"/>
+          <a:chOff x="0" y="0"/>
+          <a:chExt cx="0" cy="0"/>
+        </a:xfrm>
+      </p:grpSpPr>
+      <p:sp>
+        <p:nvSpPr>
+          <p:cNvPr id="4" name="Shape 36"/>
+          <p:cNvSpPr/>
+          <p:nvPr userDrawn="1"/>
+        </p:nvSpPr>
+        <p:spPr>
+          <a:xfrm>
+            <a:off x="579437" y="1181100"/>
+            <a:ext cx="7961313" cy="53975"/>
+          </a:xfrm>
+          <a:prstGeom prst="rect">
+            <a:avLst/>
+          </a:prstGeom>
+          <a:solidFill>
+            <a:schemeClr val="accent1">
+              <a:lumOff val="-7215"/>
+            </a:schemeClr>
+          </a:solidFill>
+          <a:ln w="12700">
+            <a:miter lim="400000"/>
+          </a:ln>
+        </p:spPr>
+        <p:txBody>
+          <a:bodyPr lIns="45719" rIns="45719"/>
+          <a:lstStyle/>
+          <a:p>
+            <a:pPr>
+              <a:defRPr sz="1800">
+                <a:solidFill>
+                  <a:srgbClr val="B22D09"/>
+                </a:solidFill>
+              </a:defRPr>
+            </a:pPr>
+            <a:endParaRPr/>
+          </a:p>
+        </p:txBody>
+      </p:sp>
+      <p:sp>
+        <p:nvSpPr>
+          <p:cNvPr id="26" name="TextBox 25"/>
+          <p:cNvSpPr txBox="1"/>
+          <p:nvPr userDrawn="1"/>
+        </p:nvSpPr>
+        <p:spPr>
+          <a:xfrm>
+            <a:off x="2768252" y="663879"/>
+            <a:ext cx="92396" cy="461663"/>
+          </a:xfrm>
+          <a:prstGeom prst="rect">
+            <a:avLst/>
+          </a:prstGeom>
+          <a:noFill/>
+          <a:ln w="12700" cap="flat">
+            <a:noFill/>
+            <a:miter lim="400000"/>
+          </a:ln>
+          <a:effectLst/>
+          <a:sp3d/>
+        </p:spPr>
+        <p:style>
+          <a:lnRef idx="0">
+            <a:scrgbClr r="0" g="0" b="0"/>
+          </a:lnRef>
+          <a:fillRef idx="0">
+            <a:scrgbClr r="0" g="0" b="0"/>
+          </a:fillRef>
+          <a:effectRef idx="0">
+            <a:scrgbClr r="0" g="0" b="0"/>
+          </a:effectRef>
+          <a:fontRef idx="none"/>
+        </p:style>
+        <p:txBody>
+          <a:bodyPr rot="0" spcFirstLastPara="1" vertOverflow="overflow" horzOverflow="overflow" vert="horz" wrap="none" lIns="45719" tIns="45719" rIns="45719" bIns="45719" numCol="1" spcCol="38100" rtlCol="0" anchor="t">
+            <a:spAutoFit/>
+          </a:bodyPr>
+          <a:lstStyle/>
+          <a:p>
+            <a:pPr marL="0" marR="0" indent="0" algn="l" defTabSz="457200" rtl="0" fontAlgn="auto" latinLnBrk="0" hangingPunct="0">
+              <a:lnSpc>
+                <a:spcPct val="100000"/>
+              </a:lnSpc>
+              <a:spcBef>
+                <a:spcPts val="0"/>
+              </a:spcBef>
+              <a:spcAft>
+                <a:spcPts val="0"/>
+              </a:spcAft>
+              <a:buClrTx/>
+              <a:buSzTx/>
+              <a:buFontTx/>
+              <a:buNone/>
+              <a:tabLst/>
+            </a:pPr>
+            <a:endParaRPr kumimoji="0" lang="en-US" sz="2400" b="0" i="0" u="none" strike="noStrike" cap="none" spc="0" normalizeH="0" baseline="0" dirty="0">
+              <a:ln>
+                <a:noFill/>
+              </a:ln>
+              <a:solidFill>
+                <a:srgbClr val="000000"/>
+              </a:solidFill>
+              <a:effectLst/>
+              <a:uFillTx/>
+              <a:latin typeface="Calibri"/>
+              <a:ea typeface="Calibri"/>
+              <a:cs typeface="Calibri"/>
+              <a:sym typeface="Calibri"/>
+            </a:endParaRPr>
+          </a:p>
+        </p:txBody>
+      </p:sp>
+      <p:sp>
+        <p:nvSpPr>
+          <p:cNvPr id="3" name="Text Placeholder 2"/>
+          <p:cNvSpPr>
+            <a:spLocks noGrp="1"/>
+          </p:cNvSpPr>
+          <p:nvPr>
+            <p:ph type="body" sz="quarter" idx="10" hasCustomPrompt="1"/>
+          </p:nvPr>
+        </p:nvSpPr>
+        <p:spPr>
+          <a:xfrm>
+            <a:off x="493200" y="1411200"/>
+            <a:ext cx="8047037" cy="4886963"/>
+          </a:xfrm>
+          <a:prstGeom prst="rect">
+            <a:avLst/>
+          </a:prstGeom>
+        </p:spPr>
+        <p:txBody>
+          <a:bodyPr>
+            <a:normAutofit/>
+          </a:bodyPr>
+          <a:lstStyle>
+            <a:lvl1pPr marL="0" marR="0" indent="0" algn="just" defTabSz="457200" rtl="0" eaLnBrk="1" fontAlgn="auto" latinLnBrk="0" hangingPunct="1">
+              <a:lnSpc>
+                <a:spcPct val="100000"/>
+              </a:lnSpc>
+              <a:spcBef>
+                <a:spcPts val="700"/>
+              </a:spcBef>
+              <a:spcAft>
+                <a:spcPts val="0"/>
+              </a:spcAft>
+              <a:buClrTx/>
+              <a:buSzPct val="100000"/>
+              <a:buFont typeface="Arial"/>
+              <a:buNone/>
+              <a:tabLst/>
+              <a:defRPr sz="2500" baseline="0">
+                <a:latin typeface="+mj-lt"/>
+                <a:ea typeface="Helvetica" charset="0"/>
+                <a:cs typeface="Helvetica" charset="0"/>
+              </a:defRPr>
+            </a:lvl1pPr>
+            <a:lvl2pPr marL="457200" marR="0" indent="0" algn="l" defTabSz="457200" rtl="0" eaLnBrk="1" fontAlgn="auto" latinLnBrk="0" hangingPunct="1">
+              <a:lnSpc>
+                <a:spcPct val="100000"/>
+              </a:lnSpc>
+              <a:spcBef>
+                <a:spcPts val="700"/>
+              </a:spcBef>
+              <a:spcAft>
+                <a:spcPts val="0"/>
+              </a:spcAft>
+              <a:buClrTx/>
+              <a:buSzPct val="100000"/>
+              <a:buFont typeface="Arial"/>
+              <a:buNone/>
+              <a:tabLst/>
+              <a:defRPr/>
+            </a:lvl2pPr>
+          </a:lstStyle>
+          <a:p>
+            <a:pPr lvl="0"/>
+            <a:r>
+              <a:rPr lang="en-US" dirty="0" err="1" smtClean="0"/>
+              <a:t>Contenido</a:t>
+            </a:r>
+            <a:endParaRPr lang="en-US" dirty="0"/>
+          </a:p>
+        </p:txBody>
+      </p:sp>
+      <p:sp>
+        <p:nvSpPr>
+          <p:cNvPr id="5" name="Text Placeholder 4"/>
+          <p:cNvSpPr>
+            <a:spLocks noGrp="1"/>
+          </p:cNvSpPr>
+          <p:nvPr>
+            <p:ph type="body" sz="quarter" idx="13" hasCustomPrompt="1"/>
+          </p:nvPr>
+        </p:nvSpPr>
+        <p:spPr>
+          <a:xfrm>
+            <a:off x="493200" y="6399084"/>
+            <a:ext cx="3349469" cy="382005"/>
+          </a:xfrm>
+        </p:spPr>
+        <p:txBody>
+          <a:bodyPr tIns="36000" bIns="57600" anchor="t" anchorCtr="0">
+            <a:noAutofit/>
+          </a:bodyPr>
+          <a:lstStyle>
+            <a:lvl1pPr>
+              <a:defRPr sz="2500" baseline="0">
+                <a:latin typeface="+mj-lt"/>
+              </a:defRPr>
+            </a:lvl1pPr>
+          </a:lstStyle>
+          <a:p>
+            <a:pPr lvl="0"/>
+            <a:r>
+              <a:rPr lang="en-US" dirty="0" err="1" smtClean="0"/>
+              <a:t>Poner</a:t>
+            </a:r>
+            <a:r>
+              <a:rPr lang="en-US" dirty="0" smtClean="0"/>
+              <a:t> solo al final de la </a:t>
+            </a:r>
+            <a:r>
+              <a:rPr lang="en-US" dirty="0" err="1" smtClean="0"/>
+              <a:t>lectura</a:t>
+            </a:r>
+            <a:endParaRPr lang="en-US" dirty="0"/>
+          </a:p>
+        </p:txBody>
+      </p:sp>
+      <p:sp>
+        <p:nvSpPr>
+          <p:cNvPr id="15" name="Text Placeholder 4"/>
+          <p:cNvSpPr>
+            <a:spLocks noGrp="1"/>
+          </p:cNvSpPr>
+          <p:nvPr>
+            <p:ph type="body" sz="quarter" idx="16" hasCustomPrompt="1"/>
+          </p:nvPr>
+        </p:nvSpPr>
+        <p:spPr>
+          <a:xfrm>
+            <a:off x="5060430" y="6399084"/>
+            <a:ext cx="3488983" cy="382005"/>
+          </a:xfrm>
+        </p:spPr>
+        <p:txBody>
+          <a:bodyPr lIns="0" tIns="36000" bIns="57600" anchor="t" anchorCtr="0">
+            <a:noAutofit/>
+          </a:bodyPr>
+          <a:lstStyle>
+            <a:lvl1pPr marL="0" marR="0" indent="0" algn="r" defTabSz="457200" rtl="0" eaLnBrk="1" fontAlgn="auto" latinLnBrk="0" hangingPunct="1">
+              <a:lnSpc>
+                <a:spcPct val="100000"/>
+              </a:lnSpc>
+              <a:spcBef>
+                <a:spcPts val="700"/>
+              </a:spcBef>
+              <a:spcAft>
+                <a:spcPts val="0"/>
+              </a:spcAft>
+              <a:buClrTx/>
+              <a:buSzPct val="100000"/>
+              <a:buFont typeface="Arial"/>
+              <a:buNone/>
+              <a:tabLst/>
+              <a:defRPr sz="2500" baseline="0">
+                <a:latin typeface="+mj-lt"/>
+              </a:defRPr>
+            </a:lvl1pPr>
+          </a:lstStyle>
+          <a:p>
+            <a:pPr marL="0" marR="0" lvl="0" indent="0" algn="r" defTabSz="457200" rtl="0" eaLnBrk="1" fontAlgn="auto" latinLnBrk="0" hangingPunct="1">
+              <a:lnSpc>
+                <a:spcPct val="100000"/>
+              </a:lnSpc>
+              <a:spcBef>
+                <a:spcPts val="700"/>
+              </a:spcBef>
+              <a:spcAft>
+                <a:spcPts val="0"/>
+              </a:spcAft>
+              <a:buClrTx/>
+              <a:buSzPct val="100000"/>
+              <a:buFont typeface="Arial"/>
+              <a:buNone/>
+              <a:tabLst/>
+              <a:defRPr/>
+            </a:pPr>
+            <a:r>
+              <a:rPr lang="en-US" dirty="0" smtClean="0"/>
+              <a:t>Gloria a </a:t>
+            </a:r>
+            <a:r>
+              <a:rPr lang="en-US" dirty="0" err="1" smtClean="0"/>
+              <a:t>tí</a:t>
+            </a:r>
+            <a:r>
+              <a:rPr lang="en-US" dirty="0" smtClean="0"/>
+              <a:t>, </a:t>
+            </a:r>
+            <a:r>
+              <a:rPr lang="en-US" dirty="0" err="1" smtClean="0"/>
+              <a:t>Señor</a:t>
+            </a:r>
+            <a:r>
+              <a:rPr lang="en-US" dirty="0" smtClean="0"/>
+              <a:t> </a:t>
+            </a:r>
+            <a:r>
+              <a:rPr lang="en-US" dirty="0" err="1" smtClean="0"/>
+              <a:t>Jesús</a:t>
+            </a:r>
+            <a:endParaRPr lang="en-US" dirty="0"/>
+          </a:p>
+        </p:txBody>
+      </p:sp>
+      <p:sp>
+        <p:nvSpPr>
+          <p:cNvPr id="16" name="Text Placeholder 12"/>
+          <p:cNvSpPr>
+            <a:spLocks noGrp="1"/>
+          </p:cNvSpPr>
+          <p:nvPr>
+            <p:ph type="body" sz="quarter" idx="17" hasCustomPrompt="1"/>
+          </p:nvPr>
+        </p:nvSpPr>
+        <p:spPr>
+          <a:xfrm>
+            <a:off x="4658403" y="6399084"/>
+            <a:ext cx="402027" cy="382588"/>
+          </a:xfrm>
+        </p:spPr>
+        <p:txBody>
+          <a:bodyPr rIns="0">
+            <a:noAutofit/>
+          </a:bodyPr>
+          <a:lstStyle>
+            <a:lvl1pPr>
+              <a:defRPr sz="2400" b="1">
+                <a:latin typeface="+mj-lt"/>
+                <a:ea typeface="Helvetica" charset="0"/>
+                <a:cs typeface="Helvetica" charset="0"/>
+              </a:defRPr>
+            </a:lvl1pPr>
+          </a:lstStyle>
+          <a:p>
+            <a:pPr lvl="0"/>
+            <a:r>
+              <a:rPr lang="en-US" dirty="0" smtClean="0"/>
+              <a:t>R.</a:t>
+            </a:r>
+            <a:endParaRPr lang="en-US" dirty="0"/>
+          </a:p>
+        </p:txBody>
+      </p:sp>
+    </p:spTree>
+    <p:extLst/>
+  </p:cSld>
+  <p:clrMapOvr>
+    <a:masterClrMapping/>
+  </p:clrMapOvr>
+  <p:transition spd="med"/>
+  <p:timing>
+    <p:tnLst>
+      <p:par>
+        <p:cTn id="1" dur="indefinite" restart="never" nodeType="tmRoot"/>
+      </p:par>
+    </p:tnLst>
+  </p:timing>
+</p:sldLayout>
+</file>
+
+<file path=ppt/slideLayouts/slideLayout7.xml><?xml version="1.0" encoding="utf-8"?>
+<p:sldLayout xmlns:a="http://schemas.openxmlformats.org/drawingml/2006/main" xmlns:r="http://schemas.openxmlformats.org/officeDocument/2006/relationships" xmlns:p="http://schemas.openxmlformats.org/presentationml/2006/main" preserve="1" userDrawn="1">
   <p:cSld name="Blank">
     <p:spTree>
       <p:nvGrpSpPr>
@@ -3084,7 +3473,8 @@
     <p:sldLayoutId id="2147483655" r:id="rId3"/>
     <p:sldLayoutId id="2147483656" r:id="rId4"/>
     <p:sldLayoutId id="2147483657" r:id="rId5"/>
-    <p:sldLayoutId id="2147483658" r:id="rId6"/>
+    <p:sldLayoutId id="2147483659" r:id="rId6"/>
+    <p:sldLayoutId id="2147483658" r:id="rId7"/>
   </p:sldLayoutIdLst>
   <p:transition spd="med"/>
   <p:timing>

</xml_diff>

<commit_message>
Fixed some slide layouts
</commit_message>
<xml_diff>
--- a/app/maker/plantilla python.pptx
+++ b/app/maker/plantilla python.pptx
@@ -407,7 +407,7 @@
           <a:p>
             <a:fld id="{A2F1CC36-F4A9-BC45-A389-D7D93F3A36E0}" type="datetimeFigureOut">
               <a:rPr lang="en-US" smtClean="0"/>
-              <a:t>12/13/17</a:t>
+              <a:t>12/14/17</a:t>
             </a:fld>
             <a:endParaRPr lang="en-US"/>
           </a:p>
@@ -1573,7 +1573,7 @@
         <p:spPr>
           <a:xfrm>
             <a:off x="493200" y="1411200"/>
-            <a:ext cx="8047037" cy="4886963"/>
+            <a:ext cx="8047037" cy="5375082"/>
           </a:xfrm>
           <a:prstGeom prst="rect">
             <a:avLst/>
@@ -3098,7 +3098,7 @@
         <p:spPr>
           <a:xfrm>
             <a:off x="493200" y="1411200"/>
-            <a:ext cx="8047037" cy="4886963"/>
+            <a:ext cx="8047037" cy="5303365"/>
           </a:xfrm>
           <a:prstGeom prst="rect">
             <a:avLst/>
@@ -3160,172 +3160,91 @@
       </p:sp>
       <p:sp>
         <p:nvSpPr>
-          <p:cNvPr id="5" name="Text Placeholder 4"/>
-          <p:cNvSpPr>
-            <a:spLocks noGrp="1"/>
-          </p:cNvSpPr>
-          <p:nvPr>
-            <p:ph type="body" sz="quarter" idx="13" hasCustomPrompt="1"/>
-          </p:nvPr>
+          <p:cNvPr id="8" name="TextBox 7"/>
+          <p:cNvSpPr txBox="1"/>
+          <p:nvPr userDrawn="1"/>
         </p:nvSpPr>
         <p:spPr>
           <a:xfrm>
-            <a:off x="493200" y="6399084"/>
-            <a:ext cx="3349469" cy="382005"/>
+            <a:off x="493199" y="365127"/>
+            <a:ext cx="8047037" cy="646329"/>
           </a:xfrm>
+          <a:prstGeom prst="rect">
+            <a:avLst/>
+          </a:prstGeom>
+          <a:noFill/>
+          <a:ln w="12700" cap="flat">
+            <a:noFill/>
+            <a:miter lim="400000"/>
+          </a:ln>
+          <a:effectLst/>
+          <a:sp3d/>
         </p:spPr>
+        <p:style>
+          <a:lnRef idx="0">
+            <a:scrgbClr r="0" g="0" b="0"/>
+          </a:lnRef>
+          <a:fillRef idx="0">
+            <a:scrgbClr r="0" g="0" b="0"/>
+          </a:fillRef>
+          <a:effectRef idx="0">
+            <a:scrgbClr r="0" g="0" b="0"/>
+          </a:effectRef>
+          <a:fontRef idx="none"/>
+        </p:style>
         <p:txBody>
-          <a:bodyPr tIns="36000" bIns="57600" anchor="t" anchorCtr="0">
-            <a:noAutofit/>
+          <a:bodyPr rot="0" spcFirstLastPara="1" vertOverflow="overflow" horzOverflow="overflow" vert="horz" wrap="square" lIns="45719" tIns="45719" rIns="45719" bIns="45719" numCol="1" spcCol="38100" rtlCol="0" anchor="t">
+            <a:spAutoFit/>
           </a:bodyPr>
-          <a:lstStyle>
-            <a:lvl1pPr>
-              <a:defRPr sz="2500" baseline="0">
-                <a:latin typeface="+mj-lt"/>
-              </a:defRPr>
-            </a:lvl1pPr>
-          </a:lstStyle>
+          <a:lstStyle/>
           <a:p>
-            <a:pPr lvl="0"/>
-            <a:r>
-              <a:rPr lang="en-US" dirty="0" err="1" smtClean="0"/>
-              <a:t>Poner</a:t>
-            </a:r>
-            <a:r>
-              <a:rPr lang="en-US" dirty="0" smtClean="0"/>
-              <a:t> solo al final de la </a:t>
-            </a:r>
-            <a:r>
-              <a:rPr lang="en-US" dirty="0" err="1" smtClean="0"/>
-              <a:t>lectura</a:t>
-            </a:r>
-            <a:endParaRPr lang="en-US" dirty="0"/>
-          </a:p>
-        </p:txBody>
-      </p:sp>
-      <p:sp>
-        <p:nvSpPr>
-          <p:cNvPr id="15" name="Text Placeholder 4"/>
-          <p:cNvSpPr>
-            <a:spLocks noGrp="1"/>
-          </p:cNvSpPr>
-          <p:nvPr>
-            <p:ph type="body" sz="quarter" idx="16" hasCustomPrompt="1"/>
-          </p:nvPr>
-        </p:nvSpPr>
-        <p:spPr>
-          <a:xfrm>
-            <a:off x="5060430" y="6399084"/>
-            <a:ext cx="3488983" cy="382005"/>
-          </a:xfrm>
-        </p:spPr>
-        <p:txBody>
-          <a:bodyPr lIns="0" tIns="36000" bIns="57600" anchor="t" anchorCtr="0">
-            <a:noAutofit/>
-          </a:bodyPr>
-          <a:lstStyle>
-            <a:lvl1pPr marL="0" marR="0" indent="0" algn="r" defTabSz="457200" rtl="0" eaLnBrk="1" fontAlgn="auto" latinLnBrk="0" hangingPunct="1">
+            <a:pPr marL="0" marR="0" indent="0" algn="l" defTabSz="457200" rtl="0" fontAlgn="auto" latinLnBrk="0" hangingPunct="0">
               <a:lnSpc>
                 <a:spcPct val="100000"/>
               </a:lnSpc>
               <a:spcBef>
-                <a:spcPts val="700"/>
+                <a:spcPts val="0"/>
               </a:spcBef>
               <a:spcAft>
                 <a:spcPts val="0"/>
               </a:spcAft>
               <a:buClrTx/>
-              <a:buSzPct val="100000"/>
-              <a:buFont typeface="Arial"/>
+              <a:buSzTx/>
+              <a:buFontTx/>
               <a:buNone/>
               <a:tabLst/>
-              <a:defRPr sz="2500" baseline="0">
-                <a:latin typeface="+mj-lt"/>
-              </a:defRPr>
-            </a:lvl1pPr>
-          </a:lstStyle>
-          <a:p>
-            <a:pPr marL="0" marR="0" lvl="0" indent="0" algn="r" defTabSz="457200" rtl="0" eaLnBrk="1" fontAlgn="auto" latinLnBrk="0" hangingPunct="1">
-              <a:lnSpc>
-                <a:spcPct val="100000"/>
-              </a:lnSpc>
-              <a:spcBef>
-                <a:spcPts val="700"/>
-              </a:spcBef>
-              <a:spcAft>
-                <a:spcPts val="0"/>
-              </a:spcAft>
-              <a:buClrTx/>
-              <a:buSzPct val="100000"/>
-              <a:buFont typeface="Arial"/>
-              <a:buNone/>
-              <a:tabLst/>
-              <a:defRPr/>
             </a:pPr>
             <a:r>
-              <a:rPr lang="en-US" dirty="0" smtClean="0"/>
-              <a:t>Gloria a </a:t>
-            </a:r>
-            <a:r>
-              <a:rPr lang="en-US" dirty="0" err="1" smtClean="0"/>
-              <a:t>tí</a:t>
-            </a:r>
-            <a:r>
-              <a:rPr lang="en-US" dirty="0" smtClean="0"/>
-              <a:t>, </a:t>
-            </a:r>
-            <a:r>
-              <a:rPr lang="en-US" dirty="0" err="1" smtClean="0"/>
-              <a:t>Señor</a:t>
-            </a:r>
-            <a:r>
-              <a:rPr lang="en-US" dirty="0" smtClean="0"/>
-              <a:t> </a:t>
-            </a:r>
-            <a:r>
-              <a:rPr lang="en-US" dirty="0" err="1" smtClean="0"/>
-              <a:t>Jesús</a:t>
-            </a:r>
-            <a:endParaRPr lang="en-US" dirty="0"/>
-          </a:p>
-        </p:txBody>
-      </p:sp>
-      <p:sp>
-        <p:nvSpPr>
-          <p:cNvPr id="16" name="Text Placeholder 12"/>
-          <p:cNvSpPr>
-            <a:spLocks noGrp="1"/>
-          </p:cNvSpPr>
-          <p:nvPr>
-            <p:ph type="body" sz="quarter" idx="17" hasCustomPrompt="1"/>
-          </p:nvPr>
-        </p:nvSpPr>
-        <p:spPr>
-          <a:xfrm>
-            <a:off x="4658403" y="6399084"/>
-            <a:ext cx="402027" cy="382588"/>
-          </a:xfrm>
-        </p:spPr>
-        <p:txBody>
-          <a:bodyPr rIns="0">
-            <a:noAutofit/>
-          </a:bodyPr>
-          <a:lstStyle>
-            <a:lvl1pPr>
-              <a:defRPr sz="2400" b="1">
+              <a:rPr kumimoji="0" lang="en-US" sz="3600" b="1" i="0" u="none" strike="noStrike" cap="none" spc="0" normalizeH="0" baseline="0" dirty="0" err="1" smtClean="0">
+                <a:ln>
+                  <a:noFill/>
+                </a:ln>
+                <a:solidFill>
+                  <a:srgbClr val="85280E"/>
+                </a:solidFill>
+                <a:effectLst/>
+                <a:uFillTx/>
                 <a:latin typeface="+mj-lt"/>
                 <a:ea typeface="Helvetica" charset="0"/>
                 <a:cs typeface="Helvetica" charset="0"/>
-              </a:defRPr>
-            </a:lvl1pPr>
-          </a:lstStyle>
-          <a:p>
-            <a:pPr lvl="0"/>
-            <a:r>
-              <a:rPr lang="en-US" dirty="0" smtClean="0"/>
-              <a:t>R.</a:t>
+                <a:sym typeface="Calibri"/>
+              </a:rPr>
+              <a:t>Avisos</a:t>
             </a:r>
-            <a:endParaRPr lang="en-US" dirty="0"/>
+            <a:endParaRPr kumimoji="0" lang="en-US" sz="3600" b="1" i="0" u="none" strike="noStrike" cap="none" spc="0" normalizeH="0" baseline="0" dirty="0">
+              <a:ln>
+                <a:noFill/>
+              </a:ln>
+              <a:solidFill>
+                <a:srgbClr val="85280E"/>
+              </a:solidFill>
+              <a:effectLst/>
+              <a:uFillTx/>
+              <a:latin typeface="+mj-lt"/>
+              <a:ea typeface="Helvetica" charset="0"/>
+              <a:cs typeface="Helvetica" charset="0"/>
+              <a:sym typeface="Calibri"/>
+            </a:endParaRPr>
           </a:p>
         </p:txBody>
       </p:sp>

</xml_diff>

<commit_message>
Renamed some slide layouts
</commit_message>
<xml_diff>
--- a/app/maker/plantilla python.pptx
+++ b/app/maker/plantilla python.pptx
@@ -648,7 +648,7 @@
 
 <file path=ppt/slideLayouts/slideLayout1.xml><?xml version="1.0" encoding="utf-8"?>
 <p:sldLayout xmlns:a="http://schemas.openxmlformats.org/drawingml/2006/main" xmlns:r="http://schemas.openxmlformats.org/officeDocument/2006/relationships" xmlns:p="http://schemas.openxmlformats.org/presentationml/2006/main" preserve="1" userDrawn="1">
-  <p:cSld name="Custom Layout">
+  <p:cSld name="Portada">
     <p:spTree>
       <p:nvGrpSpPr>
         <p:cNvPr id="1" name=""/>
@@ -2413,7 +2413,7 @@
 
 <file path=ppt/slideLayouts/slideLayout5.xml><?xml version="1.0" encoding="utf-8"?>
 <p:sldLayout xmlns:a="http://schemas.openxmlformats.org/drawingml/2006/main" xmlns:r="http://schemas.openxmlformats.org/officeDocument/2006/relationships" xmlns:p="http://schemas.openxmlformats.org/presentationml/2006/main" preserve="1" userDrawn="1">
-  <p:cSld name="2_Primera Lectura">
+  <p:cSld name="Evangelio">
     <p:spTree>
       <p:nvGrpSpPr>
         <p:cNvPr id="1" name=""/>
@@ -2959,7 +2959,7 @@
 
 <file path=ppt/slideLayouts/slideLayout6.xml><?xml version="1.0" encoding="utf-8"?>
 <p:sldLayout xmlns:a="http://schemas.openxmlformats.org/drawingml/2006/main" xmlns:r="http://schemas.openxmlformats.org/officeDocument/2006/relationships" xmlns:p="http://schemas.openxmlformats.org/presentationml/2006/main" preserve="1" userDrawn="1">
-  <p:cSld name="3_Primera Lectura">
+  <p:cSld name="Avisos">
     <p:spTree>
       <p:nvGrpSpPr>
         <p:cNvPr id="1" name=""/>

</xml_diff>

<commit_message>
Removed image from the cover
</commit_message>
<xml_diff>
--- a/app/maker/plantilla python.pptx
+++ b/app/maker/plantilla python.pptx
@@ -407,7 +407,7 @@
           <a:p>
             <a:fld id="{A2F1CC36-F4A9-BC45-A389-D7D93F3A36E0}" type="datetimeFigureOut">
               <a:rPr lang="en-US" smtClean="0"/>
-              <a:t>12/14/17</a:t>
+              <a:t>5/21/18</a:t>
             </a:fld>
             <a:endParaRPr lang="en-US"/>
           </a:p>
@@ -675,8 +675,8 @@
         </p:nvSpPr>
         <p:spPr>
           <a:xfrm>
-            <a:off x="262800" y="3675600"/>
-            <a:ext cx="8618400" cy="1029600"/>
+            <a:off x="457055" y="2254792"/>
+            <a:ext cx="8137525" cy="1029600"/>
           </a:xfrm>
           <a:prstGeom prst="rect">
             <a:avLst/>
@@ -698,36 +698,6 @@
           </a:p>
         </p:txBody>
       </p:sp>
-      <p:pic>
-        <p:nvPicPr>
-          <p:cNvPr id="6" name="banner amarillo.jpg"/>
-          <p:cNvPicPr>
-            <a:picLocks/>
-          </p:cNvPicPr>
-          <p:nvPr userDrawn="1"/>
-        </p:nvPicPr>
-        <p:blipFill>
-          <a:blip r:embed="rId2">
-            <a:extLst/>
-          </a:blip>
-          <a:srcRect/>
-          <a:stretch>
-            <a:fillRect/>
-          </a:stretch>
-        </p:blipFill>
-        <p:spPr>
-          <a:xfrm>
-            <a:off x="184841" y="154656"/>
-            <a:ext cx="7506114" cy="2159001"/>
-          </a:xfrm>
-          <a:prstGeom prst="rect">
-            <a:avLst/>
-          </a:prstGeom>
-          <a:ln w="12700">
-            <a:miter lim="400000"/>
-          </a:ln>
-        </p:spPr>
-      </p:pic>
       <p:sp>
         <p:nvSpPr>
           <p:cNvPr id="7" name="Shape 30"/>
@@ -736,7 +706,7 @@
         </p:nvSpPr>
         <p:spPr>
           <a:xfrm>
-            <a:off x="546100" y="2690812"/>
+            <a:off x="457055" y="942217"/>
             <a:ext cx="8137525" cy="46039"/>
           </a:xfrm>
           <a:prstGeom prst="rect">
@@ -778,7 +748,7 @@
         </p:nvSpPr>
         <p:spPr>
           <a:xfrm>
-            <a:off x="2808000" y="5176800"/>
+            <a:off x="2761817" y="4118411"/>
             <a:ext cx="3528000" cy="540000"/>
           </a:xfrm>
           <a:prstGeom prst="rect">
@@ -822,6 +792,44 @@
               <a:t>Fecha_ppt</a:t>
             </a:r>
             <a:endParaRPr lang="en-US" dirty="0"/>
+          </a:p>
+        </p:txBody>
+      </p:sp>
+      <p:sp>
+        <p:nvSpPr>
+          <p:cNvPr id="9" name="Shape 30"/>
+          <p:cNvSpPr/>
+          <p:nvPr userDrawn="1"/>
+        </p:nvSpPr>
+        <p:spPr>
+          <a:xfrm>
+            <a:off x="457055" y="5863503"/>
+            <a:ext cx="8137525" cy="46039"/>
+          </a:xfrm>
+          <a:prstGeom prst="rect">
+            <a:avLst/>
+          </a:prstGeom>
+          <a:solidFill>
+            <a:schemeClr val="accent1">
+              <a:lumOff val="-7215"/>
+            </a:schemeClr>
+          </a:solidFill>
+          <a:ln w="12700">
+            <a:miter lim="400000"/>
+          </a:ln>
+        </p:spPr>
+        <p:txBody>
+          <a:bodyPr lIns="45719" rIns="45719"/>
+          <a:lstStyle/>
+          <a:p>
+            <a:pPr>
+              <a:defRPr sz="1800">
+                <a:solidFill>
+                  <a:srgbClr val="B22D09"/>
+                </a:solidFill>
+              </a:defRPr>
+            </a:pPr>
+            <a:endParaRPr/>
           </a:p>
         </p:txBody>
       </p:sp>

</xml_diff>

<commit_message>
Bug. Month starting on sunday fix
</commit_message>
<xml_diff>
--- a/app/maker/plantilla python.pptx
+++ b/app/maker/plantilla python.pptx
@@ -675,7 +675,7 @@
         </p:nvSpPr>
         <p:spPr>
           <a:xfrm>
-            <a:off x="457055" y="3119074"/>
+            <a:off x="457055" y="2604274"/>
             <a:ext cx="8137525" cy="1029600"/>
           </a:xfrm>
           <a:prstGeom prst="rect">
@@ -710,7 +710,7 @@
         </p:nvSpPr>
         <p:spPr>
           <a:xfrm>
-            <a:off x="2761817" y="1893846"/>
+            <a:off x="2761817" y="2064274"/>
             <a:ext cx="3528000" cy="540000"/>
           </a:xfrm>
           <a:prstGeom prst="rect">

</xml_diff>

<commit_message>
fix: adjust R. font size
</commit_message>
<xml_diff>
--- a/app/maker/plantilla python.pptx
+++ b/app/maker/plantilla python.pptx
@@ -5,11 +5,14 @@
     <p:sldMasterId id="2147483648" r:id="rId1"/>
   </p:sldMasterIdLst>
   <p:notesMasterIdLst>
-    <p:notesMasterId r:id="rId2"/>
+    <p:notesMasterId r:id="rId3"/>
   </p:notesMasterIdLst>
   <p:handoutMasterIdLst>
-    <p:handoutMasterId r:id="rId3"/>
+    <p:handoutMasterId r:id="rId4"/>
   </p:handoutMasterIdLst>
+  <p:sldIdLst>
+    <p:sldId id="256" r:id="rId2"/>
+  </p:sldIdLst>
   <p:sldSz cx="9144000" cy="6858000" type="screen4x3"/>
   <p:notesSz cx="6858000" cy="9144000"/>
   <p:defaultTextStyle>
@@ -321,10 +324,6 @@
 </p:presentation>
 </file>
 
-<file path=ppt/revisionInfo.xml><?xml version="1.0" encoding="utf-8"?>
-<p1510:revInfo xmlns:a="http://schemas.openxmlformats.org/drawingml/2006/main" xmlns:r="http://schemas.openxmlformats.org/officeDocument/2006/relationships" xmlns:p1510="http://schemas.microsoft.com/office/powerpoint/2015/10/main"/>
-</file>
-
 <file path=ppt/handoutMasters/handoutMaster1.xml><?xml version="1.0" encoding="utf-8"?>
 <p:handoutMaster xmlns:a="http://schemas.openxmlformats.org/drawingml/2006/main" xmlns:r="http://schemas.openxmlformats.org/officeDocument/2006/relationships" xmlns:p="http://schemas.openxmlformats.org/presentationml/2006/main">
   <p:cSld>
@@ -407,7 +406,7 @@
           <a:p>
             <a:fld id="{A2F1CC36-F4A9-BC45-A389-D7D93F3A36E0}" type="datetimeFigureOut">
               <a:rPr lang="en-US" smtClean="0"/>
-              <a:t>7/1/18</a:t>
+              <a:t>5/12/19</a:t>
             </a:fld>
             <a:endParaRPr lang="en-US"/>
           </a:p>
@@ -691,7 +690,7 @@
           </a:lstStyle>
           <a:p>
             <a:r>
-              <a:rPr lang="en-US" dirty="0" err="1" smtClean="0"/>
+              <a:rPr lang="en-US" dirty="0" err="1"/>
               <a:t>Titulo_ppt</a:t>
             </a:r>
             <a:endParaRPr lang="en-US" dirty="0"/>
@@ -750,7 +749,7 @@
               <a:defRPr/>
             </a:pPr>
             <a:r>
-              <a:rPr lang="en-US" dirty="0" err="1" smtClean="0"/>
+              <a:rPr lang="en-US" dirty="0" err="1"/>
               <a:t>Fecha_ppt</a:t>
             </a:r>
             <a:endParaRPr lang="en-US" dirty="0"/>
@@ -1003,7 +1002,7 @@
           <a:p>
             <a:pPr lvl="0"/>
             <a:r>
-              <a:rPr lang="en-US" dirty="0" err="1" smtClean="0"/>
+              <a:rPr lang="en-US" dirty="0" err="1"/>
               <a:t>Contenido</a:t>
             </a:r>
             <a:endParaRPr lang="en-US" dirty="0"/>
@@ -1062,18 +1061,17 @@
               <a:defRPr/>
             </a:pPr>
             <a:r>
-              <a:rPr lang="en-US" dirty="0" smtClean="0"/>
+              <a:rPr lang="en-US" dirty="0"/>
               <a:t>(</a:t>
             </a:r>
             <a:r>
-              <a:rPr lang="en-US" dirty="0" err="1" smtClean="0"/>
+              <a:rPr lang="en-US" dirty="0" err="1"/>
               <a:t>direccion-lectura</a:t>
             </a:r>
             <a:r>
-              <a:rPr lang="en-US" dirty="0" smtClean="0"/>
+              <a:rPr lang="en-US" dirty="0"/>
               <a:t>)</a:t>
             </a:r>
-            <a:endParaRPr lang="en-US" dirty="0"/>
           </a:p>
         </p:txBody>
       </p:sp>
@@ -1134,7 +1132,7 @@
               <a:tabLst/>
             </a:pPr>
             <a:r>
-              <a:rPr kumimoji="0" lang="en-US" sz="3600" b="1" i="0" u="none" strike="noStrike" cap="none" spc="0" normalizeH="0" baseline="0" dirty="0" err="1" smtClean="0">
+              <a:rPr kumimoji="0" lang="en-US" sz="3600" b="1" i="0" u="none" strike="noStrike" cap="none" spc="0" normalizeH="0" baseline="0" dirty="0" err="1">
                 <a:ln>
                   <a:noFill/>
                 </a:ln>
@@ -1151,7 +1149,7 @@
               <a:t>Primera</a:t>
             </a:r>
             <a:r>
-              <a:rPr kumimoji="0" lang="en-US" sz="3600" b="1" i="0" u="none" strike="noStrike" cap="none" spc="0" normalizeH="0" baseline="0" dirty="0" smtClean="0">
+              <a:rPr kumimoji="0" lang="en-US" sz="3600" b="1" i="0" u="none" strike="noStrike" cap="none" spc="0" normalizeH="0" baseline="0" dirty="0">
                 <a:ln>
                   <a:noFill/>
                 </a:ln>
@@ -1168,7 +1166,7 @@
               <a:t> </a:t>
             </a:r>
             <a:r>
-              <a:rPr kumimoji="0" lang="en-US" sz="3600" b="1" i="0" u="none" strike="noStrike" cap="none" spc="0" normalizeH="0" baseline="0" dirty="0" err="1" smtClean="0">
+              <a:rPr kumimoji="0" lang="en-US" sz="3600" b="1" i="0" u="none" strike="noStrike" cap="none" spc="0" normalizeH="0" baseline="0" dirty="0" err="1">
                 <a:ln>
                   <a:noFill/>
                 </a:ln>
@@ -1185,7 +1183,7 @@
               <a:t>Lectura</a:t>
             </a:r>
             <a:r>
-              <a:rPr kumimoji="0" lang="en-US" sz="3600" b="1" i="0" u="none" strike="noStrike" cap="none" spc="0" normalizeH="0" baseline="0" dirty="0" smtClean="0">
+              <a:rPr kumimoji="0" lang="en-US" sz="3600" b="1" i="0" u="none" strike="noStrike" cap="none" spc="0" normalizeH="0" baseline="0" dirty="0">
                 <a:ln>
                   <a:noFill/>
                 </a:ln>
@@ -1201,20 +1199,6 @@
               </a:rPr>
               <a:t> </a:t>
             </a:r>
-            <a:endParaRPr kumimoji="0" lang="en-US" sz="3600" b="1" i="0" u="none" strike="noStrike" cap="none" spc="0" normalizeH="0" baseline="0" dirty="0">
-              <a:ln>
-                <a:noFill/>
-              </a:ln>
-              <a:solidFill>
-                <a:srgbClr val="85280E"/>
-              </a:solidFill>
-              <a:effectLst/>
-              <a:uFillTx/>
-              <a:latin typeface="+mj-lt"/>
-              <a:ea typeface="Helvetica" charset="0"/>
-              <a:cs typeface="Helvetica" charset="0"/>
-              <a:sym typeface="Calibri"/>
-            </a:endParaRPr>
           </a:p>
         </p:txBody>
       </p:sp>
@@ -1278,18 +1262,18 @@
               <a:defRPr/>
             </a:pPr>
             <a:r>
-              <a:rPr lang="en-US" dirty="0" err="1" smtClean="0"/>
+              <a:rPr lang="en-US" dirty="0" err="1"/>
               <a:t>Poner</a:t>
             </a:r>
             <a:r>
-              <a:rPr lang="en-US" dirty="0" smtClean="0"/>
+              <a:rPr lang="en-US" dirty="0"/>
               <a:t> solo al final de la </a:t>
             </a:r>
             <a:r>
-              <a:rPr lang="en-US" dirty="0" err="1" smtClean="0"/>
+              <a:rPr lang="en-US" dirty="0" err="1"/>
               <a:t>lectura</a:t>
             </a:r>
-            <a:endParaRPr lang="en-US" dirty="0" smtClean="0"/>
+            <a:endParaRPr lang="en-US" dirty="0"/>
           </a:p>
           <a:p>
             <a:pPr lvl="0"/>
@@ -1327,15 +1311,15 @@
           <a:p>
             <a:pPr lvl="0"/>
             <a:r>
-              <a:rPr lang="en-US" dirty="0" err="1" smtClean="0"/>
+              <a:rPr lang="en-US" dirty="0" err="1"/>
               <a:t>Poner</a:t>
             </a:r>
             <a:r>
-              <a:rPr lang="en-US" dirty="0" smtClean="0"/>
+              <a:rPr lang="en-US" dirty="0"/>
               <a:t> solo al final de la </a:t>
             </a:r>
             <a:r>
-              <a:rPr lang="en-US" dirty="0" err="1" smtClean="0"/>
+              <a:rPr lang="en-US" dirty="0" err="1"/>
               <a:t>lectura</a:t>
             </a:r>
             <a:endParaRPr lang="en-US" dirty="0"/>
@@ -1354,8 +1338,8 @@
         </p:nvSpPr>
         <p:spPr>
           <a:xfrm>
-            <a:off x="5280316" y="6399084"/>
-            <a:ext cx="402027" cy="382588"/>
+            <a:off x="5181600" y="6399084"/>
+            <a:ext cx="500743" cy="382588"/>
           </a:xfrm>
         </p:spPr>
         <p:txBody>
@@ -1364,7 +1348,7 @@
           </a:bodyPr>
           <a:lstStyle>
             <a:lvl1pPr>
-              <a:defRPr sz="2400" b="1">
+              <a:defRPr sz="2500" b="1">
                 <a:latin typeface="+mj-lt"/>
                 <a:ea typeface="Helvetica" charset="0"/>
                 <a:cs typeface="Helvetica" charset="0"/>
@@ -1374,10 +1358,9 @@
           <a:p>
             <a:pPr lvl="0"/>
             <a:r>
-              <a:rPr lang="en-US" dirty="0" smtClean="0"/>
+              <a:rPr lang="en-US" dirty="0"/>
               <a:t>R.</a:t>
             </a:r>
-            <a:endParaRPr lang="en-US" dirty="0"/>
           </a:p>
         </p:txBody>
       </p:sp>
@@ -1392,13 +1375,6 @@
     <a:masterClrMapping/>
   </p:clrMapOvr>
   <p:transition spd="med"/>
-  <p:timing>
-    <p:tnLst>
-      <p:par>
-        <p:cTn id="1" dur="indefinite" restart="never" nodeType="tmRoot"/>
-      </p:par>
-    </p:tnLst>
-  </p:timing>
 </p:sldLayout>
 </file>
 
@@ -1596,7 +1572,7 @@
           <a:p>
             <a:pPr lvl="0"/>
             <a:r>
-              <a:rPr lang="en-US" dirty="0" err="1" smtClean="0"/>
+              <a:rPr lang="en-US" dirty="0" err="1"/>
               <a:t>Contenido</a:t>
             </a:r>
             <a:endParaRPr lang="en-US" dirty="0"/>
@@ -1655,18 +1631,17 @@
               <a:defRPr/>
             </a:pPr>
             <a:r>
-              <a:rPr lang="en-US" dirty="0" smtClean="0"/>
+              <a:rPr lang="en-US" dirty="0"/>
               <a:t>(</a:t>
             </a:r>
             <a:r>
-              <a:rPr lang="en-US" dirty="0" err="1" smtClean="0"/>
+              <a:rPr lang="en-US" dirty="0" err="1"/>
               <a:t>direccion-lectura</a:t>
             </a:r>
             <a:r>
-              <a:rPr lang="en-US" dirty="0" smtClean="0"/>
+              <a:rPr lang="en-US" dirty="0"/>
               <a:t>)</a:t>
             </a:r>
-            <a:endParaRPr lang="en-US" dirty="0"/>
           </a:p>
         </p:txBody>
       </p:sp>
@@ -1727,7 +1702,7 @@
               <a:tabLst/>
             </a:pPr>
             <a:r>
-              <a:rPr kumimoji="0" lang="en-US" sz="3600" b="1" i="0" u="none" strike="noStrike" cap="none" spc="0" normalizeH="0" baseline="0" smtClean="0">
+              <a:rPr kumimoji="0" lang="en-US" sz="3600" b="1" i="0" u="none" strike="noStrike" cap="none" spc="0" normalizeH="0" baseline="0">
                 <a:ln>
                   <a:noFill/>
                 </a:ln>
@@ -1767,13 +1742,6 @@
     <a:masterClrMapping/>
   </p:clrMapOvr>
   <p:transition spd="med"/>
-  <p:timing>
-    <p:tnLst>
-      <p:par>
-        <p:cTn id="1" dur="indefinite" restart="never" nodeType="tmRoot"/>
-      </p:par>
-    </p:tnLst>
-  </p:timing>
 </p:sldLayout>
 </file>
 
@@ -1971,7 +1939,7 @@
           <a:p>
             <a:pPr lvl="0"/>
             <a:r>
-              <a:rPr lang="en-US" dirty="0" err="1" smtClean="0"/>
+              <a:rPr lang="en-US" dirty="0" err="1"/>
               <a:t>Contenido</a:t>
             </a:r>
             <a:endParaRPr lang="en-US" dirty="0"/>
@@ -2030,18 +1998,17 @@
               <a:defRPr/>
             </a:pPr>
             <a:r>
-              <a:rPr lang="en-US" dirty="0" smtClean="0"/>
+              <a:rPr lang="en-US" dirty="0"/>
               <a:t>(</a:t>
             </a:r>
             <a:r>
-              <a:rPr lang="en-US" dirty="0" err="1" smtClean="0"/>
+              <a:rPr lang="en-US" dirty="0" err="1"/>
               <a:t>direccion-lectura</a:t>
             </a:r>
             <a:r>
-              <a:rPr lang="en-US" dirty="0" smtClean="0"/>
+              <a:rPr lang="en-US" dirty="0"/>
               <a:t>)</a:t>
             </a:r>
-            <a:endParaRPr lang="en-US" dirty="0"/>
           </a:p>
         </p:txBody>
       </p:sp>
@@ -2102,7 +2069,7 @@
               <a:tabLst/>
             </a:pPr>
             <a:r>
-              <a:rPr kumimoji="0" lang="en-US" sz="3600" b="1" i="0" u="none" strike="noStrike" cap="none" spc="0" normalizeH="0" baseline="0" dirty="0" err="1" smtClean="0">
+              <a:rPr kumimoji="0" lang="en-US" sz="3600" b="1" i="0" u="none" strike="noStrike" cap="none" spc="0" normalizeH="0" baseline="0" dirty="0" err="1">
                 <a:ln>
                   <a:noFill/>
                 </a:ln>
@@ -2119,7 +2086,7 @@
               <a:t>Segunda</a:t>
             </a:r>
             <a:r>
-              <a:rPr kumimoji="0" lang="en-US" sz="3600" b="1" i="0" u="none" strike="noStrike" cap="none" spc="0" normalizeH="0" baseline="0" dirty="0" smtClean="0">
+              <a:rPr kumimoji="0" lang="en-US" sz="3600" b="1" i="0" u="none" strike="noStrike" cap="none" spc="0" normalizeH="0" baseline="0" dirty="0">
                 <a:ln>
                   <a:noFill/>
                 </a:ln>
@@ -2136,7 +2103,7 @@
               <a:t> </a:t>
             </a:r>
             <a:r>
-              <a:rPr kumimoji="0" lang="en-US" sz="3600" b="1" i="0" u="none" strike="noStrike" cap="none" spc="0" normalizeH="0" baseline="0" dirty="0" err="1" smtClean="0">
+              <a:rPr kumimoji="0" lang="en-US" sz="3600" b="1" i="0" u="none" strike="noStrike" cap="none" spc="0" normalizeH="0" baseline="0" dirty="0" err="1">
                 <a:ln>
                   <a:noFill/>
                 </a:ln>
@@ -2153,7 +2120,7 @@
               <a:t>Lectura</a:t>
             </a:r>
             <a:r>
-              <a:rPr kumimoji="0" lang="en-US" sz="3600" b="1" i="0" u="none" strike="noStrike" cap="none" spc="0" normalizeH="0" baseline="0" dirty="0" smtClean="0">
+              <a:rPr kumimoji="0" lang="en-US" sz="3600" b="1" i="0" u="none" strike="noStrike" cap="none" spc="0" normalizeH="0" baseline="0" dirty="0">
                 <a:ln>
                   <a:noFill/>
                 </a:ln>
@@ -2169,20 +2136,6 @@
               </a:rPr>
               <a:t> </a:t>
             </a:r>
-            <a:endParaRPr kumimoji="0" lang="en-US" sz="3600" b="1" i="0" u="none" strike="noStrike" cap="none" spc="0" normalizeH="0" baseline="0" dirty="0">
-              <a:ln>
-                <a:noFill/>
-              </a:ln>
-              <a:solidFill>
-                <a:srgbClr val="85280E"/>
-              </a:solidFill>
-              <a:effectLst/>
-              <a:uFillTx/>
-              <a:latin typeface="+mj-lt"/>
-              <a:ea typeface="Helvetica" charset="0"/>
-              <a:cs typeface="Helvetica" charset="0"/>
-              <a:sym typeface="Calibri"/>
-            </a:endParaRPr>
           </a:p>
         </p:txBody>
       </p:sp>
@@ -2246,23 +2199,23 @@
               <a:defRPr/>
             </a:pPr>
             <a:r>
-              <a:rPr lang="en-US" dirty="0" smtClean="0"/>
+              <a:rPr lang="en-US" dirty="0"/>
               <a:t>(</a:t>
             </a:r>
             <a:r>
-              <a:rPr lang="en-US" dirty="0" err="1" smtClean="0"/>
+              <a:rPr lang="en-US" dirty="0" err="1"/>
               <a:t>Poner</a:t>
             </a:r>
             <a:r>
-              <a:rPr lang="en-US" dirty="0" smtClean="0"/>
+              <a:rPr lang="en-US" dirty="0"/>
               <a:t> solo al final de la </a:t>
             </a:r>
             <a:r>
-              <a:rPr lang="en-US" dirty="0" err="1" smtClean="0"/>
+              <a:rPr lang="en-US" dirty="0" err="1"/>
               <a:t>lectura</a:t>
             </a:r>
             <a:r>
-              <a:rPr lang="en-US" dirty="0" smtClean="0"/>
+              <a:rPr lang="en-US" dirty="0"/>
               <a:t>)</a:t>
             </a:r>
           </a:p>
@@ -2302,26 +2255,25 @@
           <a:p>
             <a:pPr lvl="0"/>
             <a:r>
-              <a:rPr lang="en-US" dirty="0" smtClean="0"/>
+              <a:rPr lang="en-US" dirty="0"/>
               <a:t>(</a:t>
             </a:r>
             <a:r>
-              <a:rPr lang="en-US" dirty="0" err="1" smtClean="0"/>
+              <a:rPr lang="en-US" dirty="0" err="1"/>
               <a:t>Poner</a:t>
             </a:r>
             <a:r>
-              <a:rPr lang="en-US" dirty="0" smtClean="0"/>
+              <a:rPr lang="en-US" dirty="0"/>
               <a:t> solo al final de la </a:t>
             </a:r>
             <a:r>
-              <a:rPr lang="en-US" dirty="0" err="1" smtClean="0"/>
+              <a:rPr lang="en-US" dirty="0" err="1"/>
               <a:t>lectura</a:t>
             </a:r>
             <a:r>
-              <a:rPr lang="en-US" dirty="0" smtClean="0"/>
+              <a:rPr lang="en-US" dirty="0"/>
               <a:t>)</a:t>
             </a:r>
-            <a:endParaRPr lang="en-US" dirty="0"/>
           </a:p>
         </p:txBody>
       </p:sp>
@@ -2337,8 +2289,8 @@
         </p:nvSpPr>
         <p:spPr>
           <a:xfrm>
-            <a:off x="5280316" y="6399084"/>
-            <a:ext cx="402027" cy="382588"/>
+            <a:off x="5222240" y="6399084"/>
+            <a:ext cx="460103" cy="382588"/>
           </a:xfrm>
         </p:spPr>
         <p:txBody>
@@ -2347,7 +2299,7 @@
           </a:bodyPr>
           <a:lstStyle>
             <a:lvl1pPr>
-              <a:defRPr sz="2400" b="1">
+              <a:defRPr sz="2500" b="1">
                 <a:latin typeface="+mj-lt"/>
                 <a:ea typeface="Helvetica" charset="0"/>
                 <a:cs typeface="Helvetica" charset="0"/>
@@ -2357,10 +2309,9 @@
           <a:p>
             <a:pPr lvl="0"/>
             <a:r>
-              <a:rPr lang="en-US" dirty="0" smtClean="0"/>
+              <a:rPr lang="en-US" dirty="0"/>
               <a:t>R.</a:t>
             </a:r>
-            <a:endParaRPr lang="en-US" dirty="0"/>
           </a:p>
         </p:txBody>
       </p:sp>
@@ -2371,13 +2322,6 @@
     <a:masterClrMapping/>
   </p:clrMapOvr>
   <p:transition spd="med"/>
-  <p:timing>
-    <p:tnLst>
-      <p:par>
-        <p:cTn id="1" dur="indefinite" restart="never" nodeType="tmRoot"/>
-      </p:par>
-    </p:tnLst>
-  </p:timing>
 </p:sldLayout>
 </file>
 
@@ -2575,7 +2519,7 @@
           <a:p>
             <a:pPr lvl="0"/>
             <a:r>
-              <a:rPr lang="en-US" dirty="0" err="1" smtClean="0"/>
+              <a:rPr lang="en-US" dirty="0" err="1"/>
               <a:t>Contenido</a:t>
             </a:r>
             <a:endParaRPr lang="en-US" dirty="0"/>
@@ -2634,18 +2578,17 @@
               <a:defRPr/>
             </a:pPr>
             <a:r>
-              <a:rPr lang="en-US" dirty="0" smtClean="0"/>
+              <a:rPr lang="en-US" dirty="0"/>
               <a:t>(</a:t>
             </a:r>
             <a:r>
-              <a:rPr lang="en-US" dirty="0" err="1" smtClean="0"/>
+              <a:rPr lang="en-US" dirty="0" err="1"/>
               <a:t>direccion-lectura</a:t>
             </a:r>
             <a:r>
-              <a:rPr lang="en-US" dirty="0" smtClean="0"/>
+              <a:rPr lang="en-US" dirty="0"/>
               <a:t>)</a:t>
             </a:r>
-            <a:endParaRPr lang="en-US" dirty="0"/>
           </a:p>
         </p:txBody>
       </p:sp>
@@ -2706,7 +2649,7 @@
               <a:tabLst/>
             </a:pPr>
             <a:r>
-              <a:rPr kumimoji="0" lang="en-US" sz="3600" b="1" i="0" u="none" strike="noStrike" cap="none" spc="0" normalizeH="0" baseline="0" smtClean="0">
+              <a:rPr kumimoji="0" lang="en-US" sz="3600" b="1" i="0" u="none" strike="noStrike" cap="none" spc="0" normalizeH="0" baseline="0">
                 <a:ln>
                   <a:noFill/>
                 </a:ln>
@@ -2769,15 +2712,15 @@
           <a:p>
             <a:pPr lvl="0"/>
             <a:r>
-              <a:rPr lang="en-US" dirty="0" err="1" smtClean="0"/>
+              <a:rPr lang="en-US" dirty="0" err="1"/>
               <a:t>Poner</a:t>
             </a:r>
             <a:r>
-              <a:rPr lang="en-US" dirty="0" smtClean="0"/>
+              <a:rPr lang="en-US" dirty="0"/>
               <a:t> solo al final de la </a:t>
             </a:r>
             <a:r>
-              <a:rPr lang="en-US" dirty="0" err="1" smtClean="0"/>
+              <a:rPr lang="en-US" dirty="0" err="1"/>
               <a:t>lectura</a:t>
             </a:r>
             <a:endParaRPr lang="en-US" dirty="0"/>
@@ -2844,30 +2787,25 @@
               <a:defRPr/>
             </a:pPr>
             <a:r>
-              <a:rPr lang="en-US" dirty="0" smtClean="0"/>
+              <a:rPr lang="en-US" dirty="0"/>
               <a:t>Gloria a </a:t>
             </a:r>
             <a:r>
-              <a:rPr lang="en-US" dirty="0" err="1" smtClean="0"/>
-              <a:t>tí</a:t>
+              <a:rPr lang="en-US" dirty="0" err="1"/>
+              <a:t>ti</a:t>
             </a:r>
             <a:r>
-              <a:rPr lang="en-US" dirty="0" smtClean="0"/>
+              <a:rPr lang="en-US" dirty="0"/>
               <a:t>, </a:t>
             </a:r>
             <a:r>
-              <a:rPr lang="en-US" dirty="0" err="1" smtClean="0"/>
+              <a:rPr lang="en-US" dirty="0" err="1"/>
               <a:t>Señor</a:t>
             </a:r>
             <a:r>
-              <a:rPr lang="en-US" dirty="0" smtClean="0"/>
-              <a:t> </a:t>
+              <a:rPr lang="en-US" dirty="0"/>
+              <a:t> Jesús</a:t>
             </a:r>
-            <a:r>
-              <a:rPr lang="en-US" dirty="0" err="1" smtClean="0"/>
-              <a:t>Jesús</a:t>
-            </a:r>
-            <a:endParaRPr lang="en-US" dirty="0"/>
           </a:p>
         </p:txBody>
       </p:sp>
@@ -2883,8 +2821,8 @@
         </p:nvSpPr>
         <p:spPr>
           <a:xfrm>
-            <a:off x="4658403" y="6399084"/>
-            <a:ext cx="402027" cy="382588"/>
+            <a:off x="4572001" y="6399084"/>
+            <a:ext cx="488430" cy="382588"/>
           </a:xfrm>
         </p:spPr>
         <p:txBody>
@@ -2893,7 +2831,7 @@
           </a:bodyPr>
           <a:lstStyle>
             <a:lvl1pPr>
-              <a:defRPr sz="2400" b="1">
+              <a:defRPr sz="2500" b="1">
                 <a:latin typeface="+mj-lt"/>
                 <a:ea typeface="Helvetica" charset="0"/>
                 <a:cs typeface="Helvetica" charset="0"/>
@@ -2903,10 +2841,9 @@
           <a:p>
             <a:pPr lvl="0"/>
             <a:r>
-              <a:rPr lang="en-US" dirty="0" smtClean="0"/>
+              <a:rPr lang="en-US" dirty="0"/>
               <a:t>R.</a:t>
             </a:r>
-            <a:endParaRPr lang="en-US" dirty="0"/>
           </a:p>
         </p:txBody>
       </p:sp>
@@ -2917,13 +2854,6 @@
     <a:masterClrMapping/>
   </p:clrMapOvr>
   <p:transition spd="med"/>
-  <p:timing>
-    <p:tnLst>
-      <p:par>
-        <p:cTn id="1" dur="indefinite" restart="never" nodeType="tmRoot"/>
-      </p:par>
-    </p:tnLst>
-  </p:timing>
 </p:sldLayout>
 </file>
 
@@ -3121,7 +3051,7 @@
           <a:p>
             <a:pPr lvl="0"/>
             <a:r>
-              <a:rPr lang="en-US" dirty="0" err="1" smtClean="0"/>
+              <a:rPr lang="en-US" dirty="0" err="1"/>
               <a:t>Contenido</a:t>
             </a:r>
             <a:endParaRPr lang="en-US" dirty="0"/>
@@ -3185,7 +3115,7 @@
               <a:tabLst/>
             </a:pPr>
             <a:r>
-              <a:rPr kumimoji="0" lang="en-US" sz="3600" b="1" i="0" u="none" strike="noStrike" cap="none" spc="0" normalizeH="0" baseline="0" dirty="0" err="1" smtClean="0">
+              <a:rPr kumimoji="0" lang="en-US" sz="3600" b="1" i="0" u="none" strike="noStrike" cap="none" spc="0" normalizeH="0" baseline="0" dirty="0" err="1">
                 <a:ln>
                   <a:noFill/>
                 </a:ln>
@@ -3225,13 +3155,6 @@
     <a:masterClrMapping/>
   </p:clrMapOvr>
   <p:transition spd="med"/>
-  <p:timing>
-    <p:tnLst>
-      <p:par>
-        <p:cTn id="1" dur="indefinite" restart="never" nodeType="tmRoot"/>
-      </p:par>
-    </p:tnLst>
-  </p:timing>
 </p:sldLayout>
 </file>
 
@@ -3318,38 +3241,37 @@
           <a:p>
             <a:pPr lvl="0"/>
             <a:r>
-              <a:rPr lang="en-US" dirty="0" smtClean="0"/>
+              <a:rPr lang="en-US" dirty="0"/>
               <a:t>Click to edit Master text styles</a:t>
             </a:r>
           </a:p>
           <a:p>
             <a:pPr lvl="1"/>
             <a:r>
-              <a:rPr lang="en-US" dirty="0" smtClean="0"/>
+              <a:rPr lang="en-US" dirty="0"/>
               <a:t>Second level</a:t>
             </a:r>
           </a:p>
           <a:p>
             <a:pPr lvl="2"/>
             <a:r>
-              <a:rPr lang="en-US" dirty="0" smtClean="0"/>
+              <a:rPr lang="en-US" dirty="0"/>
               <a:t>Third level</a:t>
             </a:r>
           </a:p>
           <a:p>
             <a:pPr lvl="3"/>
             <a:r>
-              <a:rPr lang="en-US" dirty="0" smtClean="0"/>
+              <a:rPr lang="en-US" dirty="0"/>
               <a:t>Fourth level</a:t>
             </a:r>
           </a:p>
           <a:p>
             <a:pPr lvl="4"/>
             <a:r>
-              <a:rPr lang="en-US" dirty="0" smtClean="0"/>
+              <a:rPr lang="en-US" dirty="0"/>
               <a:t>Fifth level</a:t>
             </a:r>
-            <a:endParaRPr lang="en-US" dirty="0"/>
           </a:p>
         </p:txBody>
       </p:sp>
@@ -3366,13 +3288,6 @@
     <p:sldLayoutId id="2147483658" r:id="rId7"/>
   </p:sldLayoutIdLst>
   <p:transition spd="med"/>
-  <p:timing>
-    <p:tnLst>
-      <p:par>
-        <p:cTn id="1" dur="indefinite" restart="never" nodeType="tmRoot"/>
-      </p:par>
-    </p:tnLst>
-  </p:timing>
   <p:txStyles>
     <p:titleStyle>
       <a:lvl1pPr marL="0" marR="0" indent="0" algn="l" defTabSz="457200" rtl="0" latinLnBrk="0">
@@ -4167,6 +4082,87 @@
 </p:sldMaster>
 </file>
 
+<file path=ppt/slides/slide1.xml><?xml version="1.0" encoding="utf-8"?>
+<p:sld xmlns:a="http://schemas.openxmlformats.org/drawingml/2006/main" xmlns:r="http://schemas.openxmlformats.org/officeDocument/2006/relationships" xmlns:p="http://schemas.openxmlformats.org/presentationml/2006/main">
+  <p:cSld>
+    <p:spTree>
+      <p:nvGrpSpPr>
+        <p:cNvPr id="1" name=""/>
+        <p:cNvGrpSpPr/>
+        <p:nvPr/>
+      </p:nvGrpSpPr>
+      <p:grpSpPr>
+        <a:xfrm>
+          <a:off x="0" y="0"/>
+          <a:ext cx="0" cy="0"/>
+          <a:chOff x="0" y="0"/>
+          <a:chExt cx="0" cy="0"/>
+        </a:xfrm>
+      </p:grpSpPr>
+      <p:sp>
+        <p:nvSpPr>
+          <p:cNvPr id="2" name="Title 1">
+            <a:extLst>
+              <a:ext uri="{FF2B5EF4-FFF2-40B4-BE49-F238E27FC236}">
+                <a16:creationId xmlns:a16="http://schemas.microsoft.com/office/drawing/2014/main" id="{EC465C56-EC72-6244-AD83-9F09D9D645CD}"/>
+              </a:ext>
+            </a:extLst>
+          </p:cNvPr>
+          <p:cNvSpPr>
+            <a:spLocks noGrp="1"/>
+          </p:cNvSpPr>
+          <p:nvPr>
+            <p:ph type="title"/>
+          </p:nvPr>
+        </p:nvSpPr>
+        <p:spPr/>
+        <p:txBody>
+          <a:bodyPr/>
+          <a:lstStyle/>
+          <a:p>
+            <a:endParaRPr lang="en-US"/>
+          </a:p>
+        </p:txBody>
+      </p:sp>
+      <p:sp>
+        <p:nvSpPr>
+          <p:cNvPr id="3" name="Text Placeholder 2">
+            <a:extLst>
+              <a:ext uri="{FF2B5EF4-FFF2-40B4-BE49-F238E27FC236}">
+                <a16:creationId xmlns:a16="http://schemas.microsoft.com/office/drawing/2014/main" id="{8F2B9307-1418-3F4C-A87B-378199D2BCC3}"/>
+              </a:ext>
+            </a:extLst>
+          </p:cNvPr>
+          <p:cNvSpPr>
+            <a:spLocks noGrp="1"/>
+          </p:cNvSpPr>
+          <p:nvPr>
+            <p:ph type="body" sz="quarter" idx="10"/>
+          </p:nvPr>
+        </p:nvSpPr>
+        <p:spPr/>
+        <p:txBody>
+          <a:bodyPr/>
+          <a:lstStyle/>
+          <a:p>
+            <a:endParaRPr lang="en-US"/>
+          </a:p>
+        </p:txBody>
+      </p:sp>
+    </p:spTree>
+    <p:extLst>
+      <p:ext uri="{BB962C8B-B14F-4D97-AF65-F5344CB8AC3E}">
+        <p14:creationId xmlns:p14="http://schemas.microsoft.com/office/powerpoint/2010/main" val="435377981"/>
+      </p:ext>
+    </p:extLst>
+  </p:cSld>
+  <p:clrMapOvr>
+    <a:masterClrMapping/>
+  </p:clrMapOvr>
+  <p:transition spd="med"/>
+</p:sld>
+</file>
+
 <file path=ppt/theme/theme1.xml><?xml version="1.0" encoding="utf-8"?>
 <a:theme xmlns:a="http://schemas.openxmlformats.org/drawingml/2006/main" name="Tema de Office">
   <a:themeElements>

</xml_diff>

<commit_message>
fix: remove duplicated cover
</commit_message>
<xml_diff>
--- a/app/maker/plantilla python.pptx
+++ b/app/maker/plantilla python.pptx
@@ -5,14 +5,11 @@
     <p:sldMasterId id="2147483648" r:id="rId1"/>
   </p:sldMasterIdLst>
   <p:notesMasterIdLst>
-    <p:notesMasterId r:id="rId3"/>
+    <p:notesMasterId r:id="rId2"/>
   </p:notesMasterIdLst>
   <p:handoutMasterIdLst>
-    <p:handoutMasterId r:id="rId4"/>
+    <p:handoutMasterId r:id="rId3"/>
   </p:handoutMasterIdLst>
-  <p:sldIdLst>
-    <p:sldId id="256" r:id="rId2"/>
-  </p:sldIdLst>
   <p:sldSz cx="9144000" cy="6858000" type="screen4x3"/>
   <p:notesSz cx="6858000" cy="9144000"/>
   <p:defaultTextStyle>
@@ -406,7 +403,7 @@
           <a:p>
             <a:fld id="{A2F1CC36-F4A9-BC45-A389-D7D93F3A36E0}" type="datetimeFigureOut">
               <a:rPr lang="en-US" smtClean="0"/>
-              <a:t>5/12/19</a:t>
+              <a:t>3/17/20</a:t>
             </a:fld>
             <a:endParaRPr lang="en-US"/>
           </a:p>
@@ -1736,7 +1733,6 @@
         </p:txBody>
       </p:sp>
     </p:spTree>
-    <p:extLst/>
   </p:cSld>
   <p:clrMapOvr>
     <a:masterClrMapping/>
@@ -2316,7 +2312,6 @@
         </p:txBody>
       </p:sp>
     </p:spTree>
-    <p:extLst/>
   </p:cSld>
   <p:clrMapOvr>
     <a:masterClrMapping/>
@@ -2848,7 +2843,6 @@
         </p:txBody>
       </p:sp>
     </p:spTree>
-    <p:extLst/>
   </p:cSld>
   <p:clrMapOvr>
     <a:masterClrMapping/>
@@ -3149,7 +3143,6 @@
         </p:txBody>
       </p:sp>
     </p:spTree>
-    <p:extLst/>
   </p:cSld>
   <p:clrMapOvr>
     <a:masterClrMapping/>
@@ -4082,87 +4075,6 @@
 </p:sldMaster>
 </file>
 
-<file path=ppt/slides/slide1.xml><?xml version="1.0" encoding="utf-8"?>
-<p:sld xmlns:a="http://schemas.openxmlformats.org/drawingml/2006/main" xmlns:r="http://schemas.openxmlformats.org/officeDocument/2006/relationships" xmlns:p="http://schemas.openxmlformats.org/presentationml/2006/main">
-  <p:cSld>
-    <p:spTree>
-      <p:nvGrpSpPr>
-        <p:cNvPr id="1" name=""/>
-        <p:cNvGrpSpPr/>
-        <p:nvPr/>
-      </p:nvGrpSpPr>
-      <p:grpSpPr>
-        <a:xfrm>
-          <a:off x="0" y="0"/>
-          <a:ext cx="0" cy="0"/>
-          <a:chOff x="0" y="0"/>
-          <a:chExt cx="0" cy="0"/>
-        </a:xfrm>
-      </p:grpSpPr>
-      <p:sp>
-        <p:nvSpPr>
-          <p:cNvPr id="2" name="Title 1">
-            <a:extLst>
-              <a:ext uri="{FF2B5EF4-FFF2-40B4-BE49-F238E27FC236}">
-                <a16:creationId xmlns:a16="http://schemas.microsoft.com/office/drawing/2014/main" id="{EC465C56-EC72-6244-AD83-9F09D9D645CD}"/>
-              </a:ext>
-            </a:extLst>
-          </p:cNvPr>
-          <p:cNvSpPr>
-            <a:spLocks noGrp="1"/>
-          </p:cNvSpPr>
-          <p:nvPr>
-            <p:ph type="title"/>
-          </p:nvPr>
-        </p:nvSpPr>
-        <p:spPr/>
-        <p:txBody>
-          <a:bodyPr/>
-          <a:lstStyle/>
-          <a:p>
-            <a:endParaRPr lang="en-US"/>
-          </a:p>
-        </p:txBody>
-      </p:sp>
-      <p:sp>
-        <p:nvSpPr>
-          <p:cNvPr id="3" name="Text Placeholder 2">
-            <a:extLst>
-              <a:ext uri="{FF2B5EF4-FFF2-40B4-BE49-F238E27FC236}">
-                <a16:creationId xmlns:a16="http://schemas.microsoft.com/office/drawing/2014/main" id="{8F2B9307-1418-3F4C-A87B-378199D2BCC3}"/>
-              </a:ext>
-            </a:extLst>
-          </p:cNvPr>
-          <p:cNvSpPr>
-            <a:spLocks noGrp="1"/>
-          </p:cNvSpPr>
-          <p:nvPr>
-            <p:ph type="body" sz="quarter" idx="10"/>
-          </p:nvPr>
-        </p:nvSpPr>
-        <p:spPr/>
-        <p:txBody>
-          <a:bodyPr/>
-          <a:lstStyle/>
-          <a:p>
-            <a:endParaRPr lang="en-US"/>
-          </a:p>
-        </p:txBody>
-      </p:sp>
-    </p:spTree>
-    <p:extLst>
-      <p:ext uri="{BB962C8B-B14F-4D97-AF65-F5344CB8AC3E}">
-        <p14:creationId xmlns:p14="http://schemas.microsoft.com/office/powerpoint/2010/main" val="435377981"/>
-      </p:ext>
-    </p:extLst>
-  </p:cSld>
-  <p:clrMapOvr>
-    <a:masterClrMapping/>
-  </p:clrMapOvr>
-  <p:transition spd="med"/>
-</p:sld>
-</file>
-
 <file path=ppt/theme/theme1.xml><?xml version="1.0" encoding="utf-8"?>
 <a:theme xmlns:a="http://schemas.openxmlformats.org/drawingml/2006/main" name="Tema de Office">
   <a:themeElements>

</xml_diff>